<commit_message>
Updating the program d10_flat_cone. The possibility to calculate structure factors has been included and the calculation of the alpha angles has been corrected to fit the real geometry of the flat cone at D10.
git-svn-id: https://forge.ill.fr/svn/crysfml@755 06508225-4b59-0410-a2a9-fdab55894d57
</commit_message>
<xml_diff>
--- a/Program_Examples/SXtal_Diffractometry/Figures-FlatCone.pptx
+++ b/Program_Examples/SXtal_Diffractometry/Figures-FlatCone.pptx
@@ -6,9 +6,10 @@
   </p:sldMasterIdLst>
   <p:sldIdLst>
     <p:sldId id="256" r:id="rId2"/>
-    <p:sldId id="258" r:id="rId3"/>
-    <p:sldId id="257" r:id="rId4"/>
-    <p:sldId id="259" r:id="rId5"/>
+    <p:sldId id="260" r:id="rId3"/>
+    <p:sldId id="258" r:id="rId4"/>
+    <p:sldId id="257" r:id="rId5"/>
+    <p:sldId id="259" r:id="rId6"/>
   </p:sldIdLst>
   <p:sldSz cx="9144000" cy="6858000" type="screen4x3"/>
   <p:notesSz cx="6858000" cy="9144000"/>
@@ -292,7 +293,7 @@
             <a:fld id="{A4DCECDD-EF45-48CF-A950-52D7DD716341}" type="datetimeFigureOut">
               <a:rPr lang="en-US" smtClean="0"/>
               <a:pPr/>
-              <a:t>3/8/2013</a:t>
+              <a:t>4/29/2013</a:t>
             </a:fld>
             <a:endParaRPr lang="en-US"/>
           </a:p>
@@ -459,7 +460,7 @@
             <a:fld id="{A4DCECDD-EF45-48CF-A950-52D7DD716341}" type="datetimeFigureOut">
               <a:rPr lang="en-US" smtClean="0"/>
               <a:pPr/>
-              <a:t>3/8/2013</a:t>
+              <a:t>4/29/2013</a:t>
             </a:fld>
             <a:endParaRPr lang="en-US"/>
           </a:p>
@@ -636,7 +637,7 @@
             <a:fld id="{A4DCECDD-EF45-48CF-A950-52D7DD716341}" type="datetimeFigureOut">
               <a:rPr lang="en-US" smtClean="0"/>
               <a:pPr/>
-              <a:t>3/8/2013</a:t>
+              <a:t>4/29/2013</a:t>
             </a:fld>
             <a:endParaRPr lang="en-US"/>
           </a:p>
@@ -803,7 +804,7 @@
             <a:fld id="{A4DCECDD-EF45-48CF-A950-52D7DD716341}" type="datetimeFigureOut">
               <a:rPr lang="en-US" smtClean="0"/>
               <a:pPr/>
-              <a:t>3/8/2013</a:t>
+              <a:t>4/29/2013</a:t>
             </a:fld>
             <a:endParaRPr lang="en-US"/>
           </a:p>
@@ -1046,7 +1047,7 @@
             <a:fld id="{A4DCECDD-EF45-48CF-A950-52D7DD716341}" type="datetimeFigureOut">
               <a:rPr lang="en-US" smtClean="0"/>
               <a:pPr/>
-              <a:t>3/8/2013</a:t>
+              <a:t>4/29/2013</a:t>
             </a:fld>
             <a:endParaRPr lang="en-US"/>
           </a:p>
@@ -1331,7 +1332,7 @@
             <a:fld id="{A4DCECDD-EF45-48CF-A950-52D7DD716341}" type="datetimeFigureOut">
               <a:rPr lang="en-US" smtClean="0"/>
               <a:pPr/>
-              <a:t>3/8/2013</a:t>
+              <a:t>4/29/2013</a:t>
             </a:fld>
             <a:endParaRPr lang="en-US"/>
           </a:p>
@@ -1750,7 +1751,7 @@
             <a:fld id="{A4DCECDD-EF45-48CF-A950-52D7DD716341}" type="datetimeFigureOut">
               <a:rPr lang="en-US" smtClean="0"/>
               <a:pPr/>
-              <a:t>3/8/2013</a:t>
+              <a:t>4/29/2013</a:t>
             </a:fld>
             <a:endParaRPr lang="en-US"/>
           </a:p>
@@ -1865,7 +1866,7 @@
             <a:fld id="{A4DCECDD-EF45-48CF-A950-52D7DD716341}" type="datetimeFigureOut">
               <a:rPr lang="en-US" smtClean="0"/>
               <a:pPr/>
-              <a:t>3/8/2013</a:t>
+              <a:t>4/29/2013</a:t>
             </a:fld>
             <a:endParaRPr lang="en-US"/>
           </a:p>
@@ -1957,7 +1958,7 @@
             <a:fld id="{A4DCECDD-EF45-48CF-A950-52D7DD716341}" type="datetimeFigureOut">
               <a:rPr lang="en-US" smtClean="0"/>
               <a:pPr/>
-              <a:t>3/8/2013</a:t>
+              <a:t>4/29/2013</a:t>
             </a:fld>
             <a:endParaRPr lang="en-US"/>
           </a:p>
@@ -2231,7 +2232,7 @@
             <a:fld id="{A4DCECDD-EF45-48CF-A950-52D7DD716341}" type="datetimeFigureOut">
               <a:rPr lang="en-US" smtClean="0"/>
               <a:pPr/>
-              <a:t>3/8/2013</a:t>
+              <a:t>4/29/2013</a:t>
             </a:fld>
             <a:endParaRPr lang="en-US"/>
           </a:p>
@@ -2481,7 +2482,7 @@
             <a:fld id="{A4DCECDD-EF45-48CF-A950-52D7DD716341}" type="datetimeFigureOut">
               <a:rPr lang="en-US" smtClean="0"/>
               <a:pPr/>
-              <a:t>3/8/2013</a:t>
+              <a:t>4/29/2013</a:t>
             </a:fld>
             <a:endParaRPr lang="en-US"/>
           </a:p>
@@ -2691,7 +2692,7 @@
             <a:fld id="{A4DCECDD-EF45-48CF-A950-52D7DD716341}" type="datetimeFigureOut">
               <a:rPr lang="en-US" smtClean="0"/>
               <a:pPr/>
-              <a:t>3/8/2013</a:t>
+              <a:t>4/29/2013</a:t>
             </a:fld>
             <a:endParaRPr lang="en-US"/>
           </a:p>
@@ -3119,6 +3120,126 @@
       </p:grpSpPr>
       <p:grpSp>
         <p:nvGrpSpPr>
+          <p:cNvPr id="5" name="Group 4"/>
+          <p:cNvGrpSpPr/>
+          <p:nvPr/>
+        </p:nvGrpSpPr>
+        <p:grpSpPr>
+          <a:xfrm>
+            <a:off x="1147763" y="376238"/>
+            <a:ext cx="6848475" cy="6105525"/>
+            <a:chOff x="1147763" y="376238"/>
+            <a:chExt cx="6848475" cy="6105525"/>
+          </a:xfrm>
+        </p:grpSpPr>
+        <p:pic>
+          <p:nvPicPr>
+            <p:cNvPr id="1026" name="Picture 2"/>
+            <p:cNvPicPr>
+              <a:picLocks noChangeAspect="1" noChangeArrowheads="1"/>
+            </p:cNvPicPr>
+            <p:nvPr/>
+          </p:nvPicPr>
+          <p:blipFill>
+            <a:blip r:embed="rId2"/>
+            <a:srcRect/>
+            <a:stretch>
+              <a:fillRect/>
+            </a:stretch>
+          </p:blipFill>
+          <p:spPr bwMode="auto">
+            <a:xfrm>
+              <a:off x="1147763" y="376238"/>
+              <a:ext cx="6848475" cy="6105525"/>
+            </a:xfrm>
+            <a:prstGeom prst="rect">
+              <a:avLst/>
+            </a:prstGeom>
+            <a:noFill/>
+            <a:ln w="9525">
+              <a:noFill/>
+              <a:miter lim="800000"/>
+              <a:headEnd/>
+              <a:tailEnd/>
+            </a:ln>
+          </p:spPr>
+        </p:pic>
+        <p:sp>
+          <p:nvSpPr>
+            <p:cNvPr id="4" name="Block Arc 3"/>
+            <p:cNvSpPr/>
+            <p:nvPr/>
+          </p:nvSpPr>
+          <p:spPr>
+            <a:xfrm rot="239044">
+              <a:off x="1561780" y="464484"/>
+              <a:ext cx="6172842" cy="5689116"/>
+            </a:xfrm>
+            <a:prstGeom prst="blockArc">
+              <a:avLst>
+                <a:gd name="adj1" fmla="val 13480017"/>
+                <a:gd name="adj2" fmla="val 86742"/>
+                <a:gd name="adj3" fmla="val 7891"/>
+              </a:avLst>
+            </a:prstGeom>
+          </p:spPr>
+          <p:style>
+            <a:lnRef idx="2">
+              <a:schemeClr val="accent1">
+                <a:shade val="50000"/>
+              </a:schemeClr>
+            </a:lnRef>
+            <a:fillRef idx="1">
+              <a:schemeClr val="accent1"/>
+            </a:fillRef>
+            <a:effectRef idx="0">
+              <a:schemeClr val="accent1"/>
+            </a:effectRef>
+            <a:fontRef idx="minor">
+              <a:schemeClr val="lt1"/>
+            </a:fontRef>
+          </p:style>
+          <p:txBody>
+            <a:bodyPr rtlCol="0" anchor="ctr"/>
+            <a:lstStyle/>
+            <a:p>
+              <a:pPr algn="ctr"/>
+              <a:endParaRPr lang="en-GB">
+                <a:solidFill>
+                  <a:schemeClr val="tx1"/>
+                </a:solidFill>
+              </a:endParaRPr>
+            </a:p>
+          </p:txBody>
+        </p:sp>
+      </p:grpSp>
+    </p:spTree>
+  </p:cSld>
+  <p:clrMapOvr>
+    <a:masterClrMapping/>
+  </p:clrMapOvr>
+</p:sld>
+</file>
+
+<file path=ppt/slides/slide3.xml><?xml version="1.0" encoding="utf-8"?>
+<p:sld xmlns:a="http://schemas.openxmlformats.org/drawingml/2006/main" xmlns:r="http://schemas.openxmlformats.org/officeDocument/2006/relationships" xmlns:p="http://schemas.openxmlformats.org/presentationml/2006/main">
+  <p:cSld>
+    <p:spTree>
+      <p:nvGrpSpPr>
+        <p:cNvPr id="1" name=""/>
+        <p:cNvGrpSpPr/>
+        <p:nvPr/>
+      </p:nvGrpSpPr>
+      <p:grpSpPr>
+        <a:xfrm>
+          <a:off x="0" y="0"/>
+          <a:ext cx="0" cy="0"/>
+          <a:chOff x="0" y="0"/>
+          <a:chExt cx="0" cy="0"/>
+        </a:xfrm>
+      </p:grpSpPr>
+      <p:grpSp>
+        <p:nvGrpSpPr>
           <p:cNvPr id="2" name="Group 41"/>
           <p:cNvGrpSpPr/>
           <p:nvPr/>
@@ -6372,7 +6493,7 @@
 </p:sld>
 </file>
 
-<file path=ppt/slides/slide3.xml><?xml version="1.0" encoding="utf-8"?>
+<file path=ppt/slides/slide4.xml><?xml version="1.0" encoding="utf-8"?>
 <p:sld xmlns:a="http://schemas.openxmlformats.org/drawingml/2006/main" xmlns:r="http://schemas.openxmlformats.org/officeDocument/2006/relationships" xmlns:p="http://schemas.openxmlformats.org/presentationml/2006/main">
   <p:cSld>
     <p:spTree>
@@ -6457,7 +6578,7 @@
 </p:sld>
 </file>
 
-<file path=ppt/slides/slide4.xml><?xml version="1.0" encoding="utf-8"?>
+<file path=ppt/slides/slide5.xml><?xml version="1.0" encoding="utf-8"?>
 <p:sld xmlns:a="http://schemas.openxmlformats.org/drawingml/2006/main" xmlns:r="http://schemas.openxmlformats.org/officeDocument/2006/relationships" xmlns:p="http://schemas.openxmlformats.org/presentationml/2006/main">
   <p:cSld>
     <p:spTree>

</xml_diff>